<commit_message>
Update tai lieu cho unit 10
Update tai lieu cho unit 10
</commit_message>
<xml_diff>
--- a/bai 10/Character device driver.pptx
+++ b/bai 10/Character device driver.pptx
@@ -230,7 +230,7 @@
           <a:p>
             <a:fld id="{9DF6B2F8-E390-BD4F-9ACD-789C35D23CE3}" type="datetimeFigureOut">
               <a:rPr lang="en-US" smtClean="0"/>
-              <a:t>1/18/2019</a:t>
+              <a:t>4/23/2019</a:t>
             </a:fld>
             <a:endParaRPr lang="en-US"/>
           </a:p>
@@ -396,7 +396,7 @@
           <a:p>
             <a:fld id="{79FF8F81-D7B9-424E-B993-6D09B3871A4E}" type="datetimeFigureOut">
               <a:rPr lang="en-US" smtClean="0"/>
-              <a:t>1/18/2019</a:t>
+              <a:t>4/23/2019</a:t>
             </a:fld>
             <a:endParaRPr lang="en-US"/>
           </a:p>
@@ -1054,7 +1054,7 @@
           <a:p>
             <a:fld id="{7F3FBE28-58BC-4486-9A8E-6C1F0E326EAB}" type="datetime1">
               <a:rPr lang="en-US" smtClean="0"/>
-              <a:t>1/18/2019</a:t>
+              <a:t>4/23/2019</a:t>
             </a:fld>
             <a:endParaRPr lang="en-US"/>
           </a:p>
@@ -1240,7 +1240,7 @@
           <a:p>
             <a:fld id="{AE5B28C3-1882-4E84-9C82-23BA74B52008}" type="datetime1">
               <a:rPr lang="en-US" smtClean="0"/>
-              <a:t>1/18/2019</a:t>
+              <a:t>4/23/2019</a:t>
             </a:fld>
             <a:endParaRPr lang="en-US"/>
           </a:p>
@@ -1424,7 +1424,7 @@
           <a:p>
             <a:fld id="{945B1917-4DD8-41D3-93A0-974B9DFBBCBF}" type="datetime1">
               <a:rPr lang="en-US" smtClean="0"/>
-              <a:t>1/18/2019</a:t>
+              <a:t>4/23/2019</a:t>
             </a:fld>
             <a:endParaRPr lang="en-US"/>
           </a:p>
@@ -1598,7 +1598,7 @@
           <a:p>
             <a:fld id="{025DB114-CA1C-4405-B4C9-B0D9B62EC79D}" type="datetimeFigureOut">
               <a:rPr lang="en-US" smtClean="0"/>
-              <a:t>1/18/2019</a:t>
+              <a:t>4/23/2019</a:t>
             </a:fld>
             <a:endParaRPr lang="en-US"/>
           </a:p>
@@ -1813,7 +1813,7 @@
           <a:p>
             <a:fld id="{403BB6E5-7AA4-4C0D-BF97-BDC69083DBC9}" type="datetime1">
               <a:rPr lang="en-US" smtClean="0"/>
-              <a:t>1/18/2019</a:t>
+              <a:t>4/23/2019</a:t>
             </a:fld>
             <a:endParaRPr lang="en-US"/>
           </a:p>
@@ -2070,7 +2070,7 @@
           <a:p>
             <a:fld id="{5E5BBB4B-2F94-4F11-9AD4-28D0EBD25231}" type="datetime1">
               <a:rPr lang="en-US" smtClean="0"/>
-              <a:t>1/18/2019</a:t>
+              <a:t>4/23/2019</a:t>
             </a:fld>
             <a:endParaRPr lang="en-US"/>
           </a:p>
@@ -2369,7 +2369,7 @@
           <a:p>
             <a:fld id="{B79A5478-161F-4B28-93E5-DE9BF6B2D5E2}" type="datetime1">
               <a:rPr lang="en-US" smtClean="0"/>
-              <a:t>1/18/2019</a:t>
+              <a:t>4/23/2019</a:t>
             </a:fld>
             <a:endParaRPr lang="en-US"/>
           </a:p>
@@ -2807,7 +2807,7 @@
           <a:p>
             <a:fld id="{30E38055-F1C9-4AC4-B9E3-476EF82AD4CC}" type="datetime1">
               <a:rPr lang="en-US" smtClean="0"/>
-              <a:t>1/18/2019</a:t>
+              <a:t>4/23/2019</a:t>
             </a:fld>
             <a:endParaRPr lang="en-US"/>
           </a:p>
@@ -2936,7 +2936,7 @@
           <a:p>
             <a:fld id="{39D9E8B6-A1D4-4191-8D54-A8260B6A1972}" type="datetime1">
               <a:rPr lang="en-US" smtClean="0"/>
-              <a:t>1/18/2019</a:t>
+              <a:t>4/23/2019</a:t>
             </a:fld>
             <a:endParaRPr lang="en-US"/>
           </a:p>
@@ -3042,7 +3042,7 @@
           <a:p>
             <a:fld id="{924C1980-AF69-46D2-A9FE-14E6E6C939BE}" type="datetime1">
               <a:rPr lang="en-US" smtClean="0"/>
-              <a:t>1/18/2019</a:t>
+              <a:t>4/23/2019</a:t>
             </a:fld>
             <a:endParaRPr lang="en-US"/>
           </a:p>
@@ -3313,7 +3313,7 @@
           <a:p>
             <a:fld id="{AAA33C03-0194-466F-B287-AA772F5566B9}" type="datetime1">
               <a:rPr lang="en-US" smtClean="0"/>
-              <a:t>1/18/2019</a:t>
+              <a:t>4/23/2019</a:t>
             </a:fld>
             <a:endParaRPr lang="en-US"/>
           </a:p>
@@ -3579,7 +3579,7 @@
           <a:p>
             <a:fld id="{D31FF56F-D32E-44F3-A5D6-9F4533FAF9BD}" type="datetime1">
               <a:rPr lang="en-US" smtClean="0"/>
-              <a:t>1/18/2019</a:t>
+              <a:t>4/23/2019</a:t>
             </a:fld>
             <a:endParaRPr lang="en-US"/>
           </a:p>
@@ -3826,7 +3826,7 @@
           <a:p>
             <a:fld id="{0289C729-EC9D-4075-8A00-DCB3B3221814}" type="datetime1">
               <a:rPr lang="en-US" smtClean="0"/>
-              <a:t>1/18/2019</a:t>
+              <a:t>4/23/2019</a:t>
             </a:fld>
             <a:endParaRPr lang="en-US"/>
           </a:p>
@@ -4263,7 +4263,6 @@
               <a:rPr lang="en-US" dirty="0"/>
               <a:t>Character device driver</a:t>
             </a:r>
-            <a:endParaRPr lang="en-US" dirty="0"/>
           </a:p>
         </p:txBody>
       </p:sp>
@@ -4535,188 +4534,48 @@
         <p:spPr/>
         <p:txBody>
           <a:bodyPr>
-            <a:normAutofit fontScale="92500" lnSpcReduction="20000"/>
+            <a:normAutofit/>
           </a:bodyPr>
           <a:lstStyle/>
           <a:p>
             <a:pPr lvl="0"/>
             <a:r>
-              <a:rPr lang="en-US" dirty="0"/>
-              <a:t>void </a:t>
-            </a:r>
+              <a:rPr lang="en-US" dirty="0" err="1" smtClean="0"/>
+              <a:t>alloc_chrdev_region</a:t>
+            </a:r>
+            <a:endParaRPr lang="en-US" dirty="0" smtClean="0"/>
+          </a:p>
+          <a:p>
+            <a:pPr lvl="0"/>
+            <a:r>
+              <a:rPr lang="en-US" dirty="0" err="1" smtClean="0"/>
+              <a:t>class_create</a:t>
+            </a:r>
+            <a:endParaRPr lang="en-US" dirty="0" smtClean="0"/>
+          </a:p>
+          <a:p>
+            <a:pPr lvl="0"/>
             <a:r>
               <a:rPr lang="en-US" dirty="0" err="1"/>
+              <a:t>device_create</a:t>
+            </a:r>
+            <a:endParaRPr lang="en-US" dirty="0"/>
+          </a:p>
+          <a:p>
+            <a:pPr lvl="0"/>
+            <a:r>
+              <a:rPr lang="en-US" dirty="0" err="1" smtClean="0"/>
               <a:t>cdev_init</a:t>
             </a:r>
-            <a:r>
-              <a:rPr lang="en-US" dirty="0"/>
-              <a:t> (	</a:t>
-            </a:r>
-            <a:r>
-              <a:rPr lang="en-US" dirty="0" err="1"/>
-              <a:t>struct</a:t>
-            </a:r>
-            <a:r>
-              <a:rPr lang="en-US" dirty="0"/>
-              <a:t> </a:t>
-            </a:r>
-            <a:r>
-              <a:rPr lang="en-US" dirty="0" err="1"/>
-              <a:t>cdev</a:t>
-            </a:r>
-            <a:r>
-              <a:rPr lang="en-US" dirty="0"/>
-              <a:t> * </a:t>
-            </a:r>
-            <a:r>
-              <a:rPr lang="en-US" dirty="0" err="1"/>
-              <a:t>cdev</a:t>
-            </a:r>
-            <a:r>
-              <a:rPr lang="en-US" dirty="0"/>
-              <a:t>,  	const </a:t>
-            </a:r>
-            <a:r>
-              <a:rPr lang="en-US" dirty="0" err="1"/>
-              <a:t>struct</a:t>
-            </a:r>
-            <a:r>
-              <a:rPr lang="en-US" dirty="0"/>
-              <a:t> </a:t>
-            </a:r>
-            <a:r>
-              <a:rPr lang="en-US" dirty="0" err="1"/>
-              <a:t>file_operations</a:t>
-            </a:r>
-            <a:r>
-              <a:rPr lang="en-US" dirty="0"/>
-              <a:t> * fops); </a:t>
-            </a:r>
+            <a:endParaRPr lang="en-US" dirty="0" smtClean="0"/>
           </a:p>
           <a:p>
             <a:pPr lvl="0"/>
-            <a:r>
-              <a:rPr lang="en-US" dirty="0"/>
-              <a:t>int </a:t>
-            </a:r>
             <a:r>
               <a:rPr lang="en-US" dirty="0" err="1"/>
               <a:t>cdev_add</a:t>
             </a:r>
-            <a:r>
-              <a:rPr lang="en-US" dirty="0"/>
-              <a:t> (	</a:t>
-            </a:r>
-            <a:r>
-              <a:rPr lang="en-US" dirty="0" err="1"/>
-              <a:t>struct</a:t>
-            </a:r>
-            <a:r>
-              <a:rPr lang="en-US" dirty="0"/>
-              <a:t> </a:t>
-            </a:r>
-            <a:r>
-              <a:rPr lang="en-US" dirty="0" err="1"/>
-              <a:t>cdev</a:t>
-            </a:r>
-            <a:r>
-              <a:rPr lang="en-US" dirty="0"/>
-              <a:t> * p, </a:t>
-            </a:r>
-            <a:r>
-              <a:rPr lang="en-US" dirty="0" err="1"/>
-              <a:t>dev_t</a:t>
-            </a:r>
-            <a:r>
-              <a:rPr lang="en-US" dirty="0"/>
-              <a:t> dev, unsigned count);</a:t>
-            </a:r>
-          </a:p>
-          <a:p>
-            <a:pPr lvl="0"/>
-            <a:r>
-              <a:rPr lang="en-US" dirty="0" err="1"/>
-              <a:t>struct</a:t>
-            </a:r>
-            <a:r>
-              <a:rPr lang="en-US" dirty="0"/>
-              <a:t> class *</a:t>
-            </a:r>
-            <a:r>
-              <a:rPr lang="en-US" dirty="0" err="1"/>
-              <a:t>class_create</a:t>
-            </a:r>
-            <a:r>
-              <a:rPr lang="en-US" dirty="0"/>
-              <a:t>(</a:t>
-            </a:r>
-            <a:r>
-              <a:rPr lang="en-US" dirty="0" err="1"/>
-              <a:t>struct</a:t>
-            </a:r>
-            <a:r>
-              <a:rPr lang="en-US" dirty="0"/>
-              <a:t> module *owner, const char *name);</a:t>
-            </a:r>
-          </a:p>
-          <a:p>
-            <a:pPr lvl="0"/>
-            <a:r>
-              <a:rPr lang="en-US" dirty="0" err="1"/>
-              <a:t>struct</a:t>
-            </a:r>
-            <a:r>
-              <a:rPr lang="en-US" dirty="0"/>
-              <a:t> device *</a:t>
-            </a:r>
-            <a:r>
-              <a:rPr lang="en-US" dirty="0" err="1"/>
-              <a:t>device_create</a:t>
-            </a:r>
-            <a:r>
-              <a:rPr lang="en-US" dirty="0"/>
-              <a:t>(</a:t>
-            </a:r>
-            <a:r>
-              <a:rPr lang="en-US" dirty="0" err="1"/>
-              <a:t>struct</a:t>
-            </a:r>
-            <a:r>
-              <a:rPr lang="en-US" dirty="0"/>
-              <a:t> class *class, </a:t>
-            </a:r>
-            <a:r>
-              <a:rPr lang="en-US" dirty="0" err="1"/>
-              <a:t>struct</a:t>
-            </a:r>
-            <a:r>
-              <a:rPr lang="en-US" dirty="0"/>
-              <a:t> device *parent, </a:t>
-            </a:r>
-            <a:r>
-              <a:rPr lang="en-US" dirty="0" err="1"/>
-              <a:t>dev_t</a:t>
-            </a:r>
-            <a:r>
-              <a:rPr lang="en-US" dirty="0"/>
-              <a:t> </a:t>
-            </a:r>
-            <a:r>
-              <a:rPr lang="en-US" dirty="0" err="1"/>
-              <a:t>devt</a:t>
-            </a:r>
-            <a:r>
-              <a:rPr lang="en-US" dirty="0"/>
-              <a:t>, const char *</a:t>
-            </a:r>
-            <a:r>
-              <a:rPr lang="en-US" dirty="0" err="1"/>
-              <a:t>fmt</a:t>
-            </a:r>
-            <a:r>
-              <a:rPr lang="en-US" dirty="0"/>
-              <a:t>,   );</a:t>
-            </a:r>
+            <a:endParaRPr lang="en-US" dirty="0"/>
           </a:p>
         </p:txBody>
       </p:sp>
@@ -4789,126 +4648,34 @@
           <a:p>
             <a:pPr lvl="0"/>
             <a:r>
-              <a:rPr lang="en-US" dirty="0"/>
-              <a:t>void </a:t>
-            </a:r>
-            <a:r>
-              <a:rPr lang="en-US" dirty="0" err="1"/>
+              <a:rPr lang="en-US" dirty="0" err="1" smtClean="0"/>
               <a:t>cdev_del</a:t>
             </a:r>
-            <a:r>
-              <a:rPr lang="en-US" dirty="0"/>
-              <a:t>(</a:t>
-            </a:r>
-            <a:r>
-              <a:rPr lang="en-US" dirty="0" err="1"/>
-              <a:t>struct</a:t>
-            </a:r>
-            <a:r>
-              <a:rPr lang="en-US" dirty="0"/>
-              <a:t> </a:t>
-            </a:r>
-            <a:r>
-              <a:rPr lang="en-US" dirty="0" err="1"/>
-              <a:t>cdev</a:t>
-            </a:r>
-            <a:r>
-              <a:rPr lang="en-US" dirty="0"/>
-              <a:t> *);</a:t>
-            </a:r>
+            <a:endParaRPr lang="en-US" dirty="0" smtClean="0"/>
           </a:p>
           <a:p>
             <a:pPr lvl="0"/>
             <a:r>
-              <a:rPr lang="en-US" dirty="0"/>
-              <a:t>void </a:t>
-            </a:r>
-            <a:r>
-              <a:rPr lang="en-US" dirty="0" err="1"/>
+              <a:rPr lang="en-US" dirty="0" err="1" smtClean="0"/>
               <a:t>device_destroy</a:t>
             </a:r>
-            <a:r>
-              <a:rPr lang="en-US" dirty="0"/>
-              <a:t>(</a:t>
-            </a:r>
-            <a:r>
-              <a:rPr lang="en-US" dirty="0" err="1"/>
-              <a:t>struct</a:t>
-            </a:r>
-            <a:r>
-              <a:rPr lang="en-US" dirty="0"/>
-              <a:t> class *class, </a:t>
-            </a:r>
-            <a:r>
-              <a:rPr lang="en-US" dirty="0" err="1"/>
-              <a:t>dev_t</a:t>
-            </a:r>
-            <a:r>
-              <a:rPr lang="en-US" dirty="0"/>
-              <a:t> </a:t>
-            </a:r>
-            <a:r>
-              <a:rPr lang="en-US" dirty="0" err="1"/>
-              <a:t>devt</a:t>
-            </a:r>
-            <a:r>
-              <a:rPr lang="en-US" dirty="0"/>
-              <a:t>);</a:t>
-            </a:r>
+            <a:endParaRPr lang="en-US" dirty="0" smtClean="0"/>
           </a:p>
           <a:p>
             <a:pPr lvl="0"/>
             <a:r>
-              <a:rPr lang="en-US" dirty="0"/>
-              <a:t>void </a:t>
-            </a:r>
-            <a:r>
-              <a:rPr lang="en-US" dirty="0" err="1"/>
+              <a:rPr lang="en-US" dirty="0" err="1" smtClean="0"/>
               <a:t>class_destroy</a:t>
             </a:r>
-            <a:r>
-              <a:rPr lang="en-US" dirty="0"/>
-              <a:t> (	</a:t>
-            </a:r>
-            <a:r>
-              <a:rPr lang="en-US" dirty="0" err="1"/>
-              <a:t>struct</a:t>
-            </a:r>
-            <a:r>
-              <a:rPr lang="en-US" dirty="0"/>
-              <a:t> class *  	</a:t>
-            </a:r>
-            <a:r>
-              <a:rPr lang="en-US" dirty="0" err="1"/>
-              <a:t>cls</a:t>
-            </a:r>
-            <a:r>
-              <a:rPr lang="en-US" dirty="0"/>
-              <a:t>); </a:t>
-            </a:r>
+            <a:endParaRPr lang="en-US" dirty="0" smtClean="0"/>
           </a:p>
           <a:p>
             <a:pPr lvl="0"/>
-            <a:r>
-              <a:rPr lang="en-US" dirty="0"/>
-              <a:t>void </a:t>
-            </a:r>
             <a:r>
               <a:rPr lang="en-US" dirty="0" err="1"/>
               <a:t>unregister_chrdev_region</a:t>
             </a:r>
-            <a:r>
-              <a:rPr lang="en-US" dirty="0"/>
-              <a:t>(</a:t>
-            </a:r>
-            <a:r>
-              <a:rPr lang="en-US" dirty="0" err="1"/>
-              <a:t>dev_t</a:t>
-            </a:r>
-            <a:r>
-              <a:rPr lang="en-US" dirty="0"/>
-              <a:t> from, unsigned count);</a:t>
-            </a:r>
+            <a:endParaRPr lang="en-US" dirty="0"/>
           </a:p>
         </p:txBody>
       </p:sp>
@@ -5001,33 +4768,45 @@
           <a:bodyPr/>
           <a:lstStyle/>
           <a:p>
-            <a:r>
-              <a:rPr lang="en-US" dirty="0" err="1" smtClean="0"/>
-              <a:t>cdev_init</a:t>
-            </a:r>
-            <a:endParaRPr lang="en-US" dirty="0" smtClean="0"/>
-          </a:p>
-          <a:p>
-            <a:r>
-              <a:rPr lang="en-US" dirty="0" err="1" smtClean="0"/>
-              <a:t>cdev_add</a:t>
-            </a:r>
-            <a:endParaRPr lang="en-US" dirty="0" smtClean="0"/>
-          </a:p>
-          <a:p>
-            <a:r>
-              <a:rPr lang="en-US" dirty="0" err="1" smtClean="0"/>
+            <a:pPr lvl="0"/>
+            <a:r>
+              <a:rPr lang="en-US" dirty="0" err="1"/>
+              <a:t>alloc_chrdev_region</a:t>
+            </a:r>
+            <a:endParaRPr lang="en-US" dirty="0"/>
+          </a:p>
+          <a:p>
+            <a:pPr lvl="0"/>
+            <a:r>
+              <a:rPr lang="en-US" dirty="0" err="1"/>
               <a:t>class_create</a:t>
             </a:r>
-            <a:endParaRPr lang="en-US" dirty="0" smtClean="0"/>
-          </a:p>
-          <a:p>
+            <a:endParaRPr lang="en-US" dirty="0"/>
+          </a:p>
+          <a:p>
+            <a:pPr lvl="0"/>
             <a:r>
               <a:rPr lang="en-US" dirty="0" err="1"/>
               <a:t>device_create</a:t>
             </a:r>
             <a:endParaRPr lang="en-US" dirty="0"/>
           </a:p>
+          <a:p>
+            <a:pPr lvl="0"/>
+            <a:r>
+              <a:rPr lang="en-US" dirty="0" err="1"/>
+              <a:t>cdev_init</a:t>
+            </a:r>
+            <a:endParaRPr lang="en-US" dirty="0"/>
+          </a:p>
+          <a:p>
+            <a:pPr lvl="0"/>
+            <a:r>
+              <a:rPr lang="en-US" dirty="0" err="1"/>
+              <a:t>cdev_add</a:t>
+            </a:r>
+            <a:endParaRPr lang="en-US" dirty="0"/>
+          </a:p>
         </p:txBody>
       </p:sp>
       <p:sp>
@@ -5068,31 +4847,33 @@
           <a:lstStyle/>
           <a:p>
             <a:r>
-              <a:rPr lang="en-US" dirty="0" err="1"/>
+              <a:rPr lang="en-US" dirty="0" err="1" smtClean="0"/>
               <a:t>unregister_chrdev_region</a:t>
             </a:r>
             <a:endParaRPr lang="en-US" dirty="0" smtClean="0"/>
           </a:p>
           <a:p>
+            <a:pPr lvl="0"/>
+            <a:r>
+              <a:rPr lang="en-US" dirty="0" err="1" smtClean="0"/>
+              <a:t>class_destroy</a:t>
+            </a:r>
+            <a:endParaRPr lang="en-US" dirty="0" smtClean="0"/>
+          </a:p>
+          <a:p>
+            <a:r>
+              <a:rPr lang="en-US" dirty="0" err="1" smtClean="0"/>
+              <a:t>device_destroy</a:t>
+            </a:r>
+            <a:endParaRPr lang="en-US" dirty="0" smtClean="0"/>
+          </a:p>
+          <a:p>
+            <a:pPr lvl="0"/>
             <a:r>
               <a:rPr lang="en-US" dirty="0" err="1" smtClean="0"/>
               <a:t>cdev_del</a:t>
             </a:r>
-            <a:endParaRPr lang="en-US" dirty="0" smtClean="0"/>
-          </a:p>
-          <a:p>
-            <a:r>
-              <a:rPr lang="en-US" dirty="0" err="1" smtClean="0"/>
-              <a:t>class_destroy</a:t>
-            </a:r>
-            <a:endParaRPr lang="en-US" dirty="0" smtClean="0"/>
-          </a:p>
-          <a:p>
-            <a:r>
-              <a:rPr lang="en-US" dirty="0" err="1" smtClean="0"/>
-              <a:t>device_destroy</a:t>
-            </a:r>
-            <a:endParaRPr lang="en-US" dirty="0" smtClean="0"/>
+            <a:endParaRPr lang="en-US" dirty="0"/>
           </a:p>
         </p:txBody>
       </p:sp>
@@ -7181,49 +6962,62 @@
           <a:p>
             <a:pPr lvl="0"/>
             <a:r>
-              <a:rPr lang="en-US"/>
+              <a:rPr lang="en-US" dirty="0"/>
               <a:t>All device file place in /dev folder</a:t>
             </a:r>
           </a:p>
           <a:p>
             <a:pPr lvl="0"/>
             <a:r>
-              <a:rPr lang="en-US"/>
+              <a:rPr lang="en-US" dirty="0"/>
               <a:t>Major number</a:t>
             </a:r>
           </a:p>
           <a:p>
             <a:pPr lvl="0"/>
             <a:r>
-              <a:rPr lang="en-US"/>
+              <a:rPr lang="en-US" dirty="0"/>
               <a:t>Minor number</a:t>
             </a:r>
           </a:p>
           <a:p>
             <a:pPr lvl="0"/>
             <a:r>
-              <a:rPr lang="en-US"/>
+              <a:rPr lang="en-US" dirty="0"/>
               <a:t>Create a device file</a:t>
             </a:r>
           </a:p>
           <a:p>
             <a:pPr lvl="1"/>
             <a:r>
-              <a:rPr lang="en-US"/>
-              <a:t>By udev</a:t>
-            </a:r>
+              <a:rPr lang="en-US" dirty="0"/>
+              <a:t>By </a:t>
+            </a:r>
+            <a:r>
+              <a:rPr lang="en-US" dirty="0" err="1"/>
+              <a:t>udev</a:t>
+            </a:r>
+            <a:endParaRPr lang="en-US" dirty="0"/>
           </a:p>
           <a:p>
             <a:pPr lvl="1"/>
             <a:r>
-              <a:rPr lang="en-US"/>
-              <a:t>By mknod command</a:t>
+              <a:rPr lang="en-US" dirty="0"/>
+              <a:t>By </a:t>
+            </a:r>
+            <a:r>
+              <a:rPr lang="en-US" dirty="0" err="1"/>
+              <a:t>mknod</a:t>
+            </a:r>
+            <a:r>
+              <a:rPr lang="en-US" dirty="0"/>
+              <a:t> command</a:t>
             </a:r>
           </a:p>
           <a:p>
             <a:pPr lvl="1"/>
             <a:r>
-              <a:rPr lang="en-US"/>
+              <a:rPr lang="en-US" dirty="0"/>
               <a:t>By device driver</a:t>
             </a:r>
           </a:p>

</xml_diff>